<commit_message>
Nasty layout bug (semicolon), comments, other
</commit_message>
<xml_diff>
--- a/advertising/Flyer-v2.pptx
+++ b/advertising/Flyer-v2.pptx
@@ -3623,7 +3623,7 @@
         </p:nvSpPr>
         <p:spPr>
           <a:xfrm>
-            <a:off x="4497571" y="9053354"/>
+            <a:off x="4497571" y="9099521"/>
             <a:ext cx="2817629" cy="507831"/>
           </a:xfrm>
           <a:prstGeom prst="rect">
@@ -3948,7 +3948,7 @@
         </p:nvSpPr>
         <p:spPr>
           <a:xfrm>
-            <a:off x="4497571" y="9053354"/>
+            <a:off x="4497571" y="9103529"/>
             <a:ext cx="2817629" cy="507831"/>
           </a:xfrm>
           <a:prstGeom prst="rect">
@@ -4021,8 +4021,8 @@
         </p:nvSpPr>
         <p:spPr>
           <a:xfrm>
-            <a:off x="1078381" y="8383938"/>
-            <a:ext cx="5615640" cy="584775"/>
+            <a:off x="526949" y="8383938"/>
+            <a:ext cx="6718506" cy="584775"/>
           </a:xfrm>
           <a:prstGeom prst="rect">
             <a:avLst/>
@@ -4036,6 +4036,17 @@
           <a:lstStyle/>
           <a:p>
             <a:pPr algn="ctr"/>
+            <a:r>
+              <a:rPr lang="en-US" b="1" u="sng" dirty="0">
+                <a:ln w="9525">
+                  <a:noFill/>
+                  <a:prstDash val="solid"/>
+                </a:ln>
+                <a:latin typeface="Courier New" panose="02070309020205020404" pitchFamily="49" charset="0"/>
+                <a:cs typeface="Courier New" panose="02070309020205020404" pitchFamily="49" charset="0"/>
+              </a:rPr>
+              <a:t>https://</a:t>
+            </a:r>
             <a:r>
               <a:rPr lang="en-US" sz="3200" b="1" u="sng" dirty="0">
                 <a:ln w="9525">

</xml_diff>

<commit_message>
New instructor API features
</commit_message>
<xml_diff>
--- a/advertising/Flyer-v2.pptx
+++ b/advertising/Flyer-v2.pptx
@@ -260,7 +260,7 @@
           <a:p>
             <a:fld id="{D13F4EBB-C284-4D2A-9CE2-921CE719548C}" type="datetimeFigureOut">
               <a:rPr lang="en-US" smtClean="0"/>
-              <a:t>2/24/2017</a:t>
+              <a:t>2/27/2017</a:t>
             </a:fld>
             <a:endParaRPr lang="en-US"/>
           </a:p>
@@ -430,7 +430,7 @@
           <a:p>
             <a:fld id="{D13F4EBB-C284-4D2A-9CE2-921CE719548C}" type="datetimeFigureOut">
               <a:rPr lang="en-US" smtClean="0"/>
-              <a:t>2/24/2017</a:t>
+              <a:t>2/27/2017</a:t>
             </a:fld>
             <a:endParaRPr lang="en-US"/>
           </a:p>
@@ -610,7 +610,7 @@
           <a:p>
             <a:fld id="{D13F4EBB-C284-4D2A-9CE2-921CE719548C}" type="datetimeFigureOut">
               <a:rPr lang="en-US" smtClean="0"/>
-              <a:t>2/24/2017</a:t>
+              <a:t>2/27/2017</a:t>
             </a:fld>
             <a:endParaRPr lang="en-US"/>
           </a:p>
@@ -780,7 +780,7 @@
           <a:p>
             <a:fld id="{D13F4EBB-C284-4D2A-9CE2-921CE719548C}" type="datetimeFigureOut">
               <a:rPr lang="en-US" smtClean="0"/>
-              <a:t>2/24/2017</a:t>
+              <a:t>2/27/2017</a:t>
             </a:fld>
             <a:endParaRPr lang="en-US"/>
           </a:p>
@@ -1024,7 +1024,7 @@
           <a:p>
             <a:fld id="{D13F4EBB-C284-4D2A-9CE2-921CE719548C}" type="datetimeFigureOut">
               <a:rPr lang="en-US" smtClean="0"/>
-              <a:t>2/24/2017</a:t>
+              <a:t>2/27/2017</a:t>
             </a:fld>
             <a:endParaRPr lang="en-US"/>
           </a:p>
@@ -1256,7 +1256,7 @@
           <a:p>
             <a:fld id="{D13F4EBB-C284-4D2A-9CE2-921CE719548C}" type="datetimeFigureOut">
               <a:rPr lang="en-US" smtClean="0"/>
-              <a:t>2/24/2017</a:t>
+              <a:t>2/27/2017</a:t>
             </a:fld>
             <a:endParaRPr lang="en-US"/>
           </a:p>
@@ -1623,7 +1623,7 @@
           <a:p>
             <a:fld id="{D13F4EBB-C284-4D2A-9CE2-921CE719548C}" type="datetimeFigureOut">
               <a:rPr lang="en-US" smtClean="0"/>
-              <a:t>2/24/2017</a:t>
+              <a:t>2/27/2017</a:t>
             </a:fld>
             <a:endParaRPr lang="en-US"/>
           </a:p>
@@ -1741,7 +1741,7 @@
           <a:p>
             <a:fld id="{D13F4EBB-C284-4D2A-9CE2-921CE719548C}" type="datetimeFigureOut">
               <a:rPr lang="en-US" smtClean="0"/>
-              <a:t>2/24/2017</a:t>
+              <a:t>2/27/2017</a:t>
             </a:fld>
             <a:endParaRPr lang="en-US"/>
           </a:p>
@@ -1836,7 +1836,7 @@
           <a:p>
             <a:fld id="{D13F4EBB-C284-4D2A-9CE2-921CE719548C}" type="datetimeFigureOut">
               <a:rPr lang="en-US" smtClean="0"/>
-              <a:t>2/24/2017</a:t>
+              <a:t>2/27/2017</a:t>
             </a:fld>
             <a:endParaRPr lang="en-US"/>
           </a:p>
@@ -2113,7 +2113,7 @@
           <a:p>
             <a:fld id="{D13F4EBB-C284-4D2A-9CE2-921CE719548C}" type="datetimeFigureOut">
               <a:rPr lang="en-US" smtClean="0"/>
-              <a:t>2/24/2017</a:t>
+              <a:t>2/27/2017</a:t>
             </a:fld>
             <a:endParaRPr lang="en-US"/>
           </a:p>
@@ -2370,7 +2370,7 @@
           <a:p>
             <a:fld id="{D13F4EBB-C284-4D2A-9CE2-921CE719548C}" type="datetimeFigureOut">
               <a:rPr lang="en-US" smtClean="0"/>
-              <a:t>2/24/2017</a:t>
+              <a:t>2/27/2017</a:t>
             </a:fld>
             <a:endParaRPr lang="en-US"/>
           </a:p>
@@ -2583,7 +2583,7 @@
           <a:p>
             <a:fld id="{D13F4EBB-C284-4D2A-9CE2-921CE719548C}" type="datetimeFigureOut">
               <a:rPr lang="en-US" smtClean="0"/>
-              <a:t>2/24/2017</a:t>
+              <a:t>2/27/2017</a:t>
             </a:fld>
             <a:endParaRPr lang="en-US"/>
           </a:p>
@@ -3644,8 +3644,25 @@
                   </a:schemeClr>
                 </a:solidFill>
               </a:rPr>
-              <a:t>We gratefully acknowledge the support of Virginia Tech and the National Science Foundation under Grants NSF DGE 0822220, NSF DUE 1444094, and NSF IUSE 1624320. </a:t>
-            </a:r>
+              <a:t>We gratefully acknowledge the support of Virginia Tech and the National Science Foundation under </a:t>
+            </a:r>
+            <a:r>
+              <a:rPr lang="en-US" sz="900" dirty="0">
+                <a:solidFill>
+                  <a:schemeClr val="bg1">
+                    <a:lumMod val="50000"/>
+                  </a:schemeClr>
+                </a:solidFill>
+              </a:rPr>
+              <a:t>NSF DGE 0822220, NSF IUSE 1624320, and NSF IUSE 479632.</a:t>
+            </a:r>
+            <a:endParaRPr lang="en-US" sz="900" dirty="0">
+              <a:solidFill>
+                <a:schemeClr val="bg1">
+                  <a:lumMod val="50000"/>
+                </a:schemeClr>
+              </a:solidFill>
+            </a:endParaRPr>
           </a:p>
         </p:txBody>
       </p:sp>
@@ -3969,8 +3986,25 @@
                   </a:schemeClr>
                 </a:solidFill>
               </a:rPr>
-              <a:t>We gratefully acknowledge the support of Virginia Tech and the National Science Foundation under Grants NSF DGE 0822220, NSF DUE 1444094, and NSF IUSE 1624320. </a:t>
-            </a:r>
+              <a:t>We gratefully acknowledge the support of Virginia Tech and the National Science Foundation under </a:t>
+            </a:r>
+            <a:r>
+              <a:rPr lang="en-US" sz="900" dirty="0">
+                <a:solidFill>
+                  <a:schemeClr val="bg1">
+                    <a:lumMod val="50000"/>
+                  </a:schemeClr>
+                </a:solidFill>
+              </a:rPr>
+              <a:t>NSF DGE 0822220, NSF IUSE 1624320, and NSF IUSE 479632.</a:t>
+            </a:r>
+            <a:endParaRPr lang="en-US" sz="900" dirty="0">
+              <a:solidFill>
+                <a:schemeClr val="bg1">
+                  <a:lumMod val="50000"/>
+                </a:schemeClr>
+              </a:solidFill>
+            </a:endParaRPr>
           </a:p>
         </p:txBody>
       </p:sp>

</xml_diff>